<commit_message>
Pequenas alterações nos modelos PowerPoint
</commit_message>
<xml_diff>
--- a/Modelos/Apresentação PowerPoint v1.pptx
+++ b/Modelos/Apresentação PowerPoint v1.pptx
@@ -5,14 +5,15 @@
     <p:sldMasterId id="2147483648" r:id="rId4"/>
   </p:sldMasterIdLst>
   <p:notesMasterIdLst>
-    <p:notesMasterId r:id="rId7"/>
+    <p:notesMasterId r:id="rId8"/>
   </p:notesMasterIdLst>
   <p:handoutMasterIdLst>
-    <p:handoutMasterId r:id="rId8"/>
+    <p:handoutMasterId r:id="rId9"/>
   </p:handoutMasterIdLst>
   <p:sldIdLst>
     <p:sldId id="258" r:id="rId5"/>
     <p:sldId id="265" r:id="rId6"/>
+    <p:sldId id="266" r:id="rId7"/>
   </p:sldIdLst>
   <p:sldSz cx="12192000" cy="6858000"/>
   <p:notesSz cx="6858000" cy="9144000"/>
@@ -863,8 +864,8 @@
         </p:nvSpPr>
         <p:spPr>
           <a:xfrm>
-            <a:off x="2832533" y="1371600"/>
-            <a:ext cx="9359467" cy="2971800"/>
+            <a:off x="2832533" y="3462715"/>
+            <a:ext cx="9359467" cy="1231900"/>
           </a:xfrm>
           <a:prstGeom prst="rect">
             <a:avLst/>
@@ -909,29 +910,22 @@
         </p:nvSpPr>
         <p:spPr>
           <a:xfrm>
-            <a:off x="2832533" y="4462272"/>
+            <a:off x="2832533" y="4813487"/>
             <a:ext cx="9359467" cy="1033272"/>
           </a:xfrm>
           <a:prstGeom prst="rect">
             <a:avLst/>
           </a:prstGeom>
-          <a:solidFill>
-            <a:schemeClr val="accent1"/>
-          </a:solidFill>
-          <a:ln>
-            <a:noFill/>
-          </a:ln>
+          <a:ln/>
         </p:spPr>
         <p:style>
-          <a:lnRef idx="2">
-            <a:schemeClr val="accent1">
-              <a:shade val="50000"/>
-            </a:schemeClr>
+          <a:lnRef idx="0">
+            <a:schemeClr val="accent1"/>
           </a:lnRef>
-          <a:fillRef idx="1">
+          <a:fillRef idx="3">
             <a:schemeClr val="accent1"/>
           </a:fillRef>
-          <a:effectRef idx="0">
+          <a:effectRef idx="3">
             <a:schemeClr val="accent1"/>
           </a:effectRef>
           <a:fontRef idx="minor">
@@ -954,13 +948,13 @@
             <a:spLocks noGrp="1"/>
           </p:cNvSpPr>
           <p:nvPr>
-            <p:ph type="ctrTitle"/>
+            <p:ph type="ctrTitle" hasCustomPrompt="1"/>
           </p:nvPr>
         </p:nvSpPr>
         <p:spPr bwMode="black">
           <a:xfrm>
-            <a:off x="3175199" y="1943842"/>
-            <a:ext cx="8500062" cy="2387600"/>
+            <a:off x="3175199" y="3462715"/>
+            <a:ext cx="8500062" cy="1219942"/>
           </a:xfrm>
         </p:spPr>
         <p:txBody>
@@ -970,7 +964,7 @@
               <a:lnSpc>
                 <a:spcPct val="90000"/>
               </a:lnSpc>
-              <a:defRPr sz="6000" b="1">
+              <a:defRPr sz="6000" b="1" baseline="0">
                 <a:solidFill>
                   <a:schemeClr val="tx1"/>
                 </a:solidFill>
@@ -981,7 +975,7 @@
             <a:pPr rtl="0"/>
             <a:r>
               <a:rPr lang="pt-PT" dirty="0" smtClean="0"/>
-              <a:t>Clique para editar o estilo</a:t>
+              <a:t>Titulo do Projeto</a:t>
             </a:r>
             <a:endParaRPr lang="pt-PT" dirty="0"/>
           </a:p>
@@ -999,7 +993,7 @@
         </p:nvSpPr>
         <p:spPr>
           <a:xfrm>
-            <a:off x="3175199" y="4538659"/>
+            <a:off x="3175199" y="4897462"/>
             <a:ext cx="8500062" cy="865321"/>
           </a:xfrm>
         </p:spPr>
@@ -1067,6 +1061,18 @@
           </p:nvPr>
         </p:nvSpPr>
         <p:spPr/>
+        <p:style>
+          <a:lnRef idx="0">
+            <a:schemeClr val="accent1"/>
+          </a:lnRef>
+          <a:fillRef idx="3">
+            <a:schemeClr val="accent1"/>
+          </a:fillRef>
+          <a:effectRef idx="3">
+            <a:schemeClr val="accent1"/>
+          </a:effectRef>
+          <a:fontRef idx="none"/>
+        </p:style>
         <p:txBody>
           <a:bodyPr rtlCol="0"/>
           <a:lstStyle/>
@@ -1091,12 +1097,26 @@
           </p:nvPr>
         </p:nvSpPr>
         <p:spPr/>
+        <p:style>
+          <a:lnRef idx="0">
+            <a:schemeClr val="accent1"/>
+          </a:lnRef>
+          <a:fillRef idx="3">
+            <a:schemeClr val="accent1"/>
+          </a:fillRef>
+          <a:effectRef idx="3">
+            <a:schemeClr val="accent1"/>
+          </a:effectRef>
+          <a:fontRef idx="none"/>
+        </p:style>
         <p:txBody>
           <a:bodyPr rtlCol="0"/>
           <a:lstStyle/>
           <a:p>
-            <a:pPr rtl="0"/>
-            <a:endParaRPr lang="pt-PT" dirty="0"/>
+            <a:r>
+              <a:rPr lang="pt-PT" dirty="0" smtClean="0"/>
+              <a:t>SharedPen</a:t>
+            </a:r>
           </a:p>
         </p:txBody>
       </p:sp>
@@ -1111,6 +1131,18 @@
           </p:nvPr>
         </p:nvSpPr>
         <p:spPr/>
+        <p:style>
+          <a:lnRef idx="0">
+            <a:schemeClr val="accent1"/>
+          </a:lnRef>
+          <a:fillRef idx="3">
+            <a:schemeClr val="accent1"/>
+          </a:fillRef>
+          <a:effectRef idx="3">
+            <a:schemeClr val="accent1"/>
+          </a:effectRef>
+          <a:fontRef idx="none"/>
+        </p:style>
         <p:txBody>
           <a:bodyPr rtlCol="0"/>
           <a:lstStyle/>
@@ -2758,7 +2790,10 @@
           <a:bodyPr rtlCol="0"/>
           <a:lstStyle/>
           <a:p>
-            <a:pPr rtl="0"/>
+            <a:r>
+              <a:rPr lang="pt-PT" dirty="0" smtClean="0"/>
+              <a:t>SharedPen</a:t>
+            </a:r>
             <a:endParaRPr lang="pt-PT" dirty="0"/>
           </a:p>
         </p:txBody>
@@ -3920,8 +3955,10 @@
             </a:lvl1pPr>
           </a:lstStyle>
           <a:p>
-            <a:pPr rtl="0"/>
-            <a:endParaRPr lang="pt-PT" dirty="0"/>
+            <a:r>
+              <a:rPr lang="pt-PT" dirty="0" smtClean="0"/>
+              <a:t>SharedPen</a:t>
+            </a:r>
           </a:p>
         </p:txBody>
       </p:sp>
@@ -4307,7 +4344,7 @@
             <a:spLocks noGrp="1"/>
           </p:cNvSpPr>
           <p:nvPr>
-            <p:ph type="ctrTitle"/>
+            <p:ph type="title"/>
           </p:nvPr>
         </p:nvSpPr>
         <p:spPr/>
@@ -4330,13 +4367,13 @@
             <a:spLocks noGrp="1"/>
           </p:cNvSpPr>
           <p:nvPr>
-            <p:ph type="subTitle" idx="1"/>
+            <p:ph type="body" idx="1"/>
           </p:nvPr>
         </p:nvSpPr>
         <p:spPr/>
         <p:txBody>
           <a:bodyPr rtlCol="0">
-            <a:normAutofit fontScale="85000" lnSpcReduction="20000"/>
+            <a:normAutofit fontScale="62500" lnSpcReduction="20000"/>
           </a:bodyPr>
           <a:lstStyle/>
           <a:p>
@@ -4359,6 +4396,63 @@
               <a:rPr lang="pt-PT" dirty="0"/>
               <a:t>2014/2015</a:t>
             </a:r>
+          </a:p>
+        </p:txBody>
+      </p:sp>
+      <p:sp>
+        <p:nvSpPr>
+          <p:cNvPr id="4" name="Marcador de Posição de Conteúdo 3"/>
+          <p:cNvSpPr>
+            <a:spLocks noGrp="1"/>
+          </p:cNvSpPr>
+          <p:nvPr>
+            <p:ph sz="half" idx="2"/>
+          </p:nvPr>
+        </p:nvSpPr>
+        <p:spPr/>
+        <p:txBody>
+          <a:bodyPr/>
+          <a:lstStyle/>
+          <a:p>
+            <a:endParaRPr lang="pt-PT"/>
+          </a:p>
+        </p:txBody>
+      </p:sp>
+      <p:sp>
+        <p:nvSpPr>
+          <p:cNvPr id="5" name="Marcador de Posição do Texto 4"/>
+          <p:cNvSpPr>
+            <a:spLocks noGrp="1"/>
+          </p:cNvSpPr>
+          <p:nvPr>
+            <p:ph type="body" sz="quarter" idx="3"/>
+          </p:nvPr>
+        </p:nvSpPr>
+        <p:spPr/>
+        <p:txBody>
+          <a:bodyPr/>
+          <a:lstStyle/>
+          <a:p>
+            <a:endParaRPr lang="pt-PT"/>
+          </a:p>
+        </p:txBody>
+      </p:sp>
+      <p:sp>
+        <p:nvSpPr>
+          <p:cNvPr id="6" name="Marcador de Posição de Conteúdo 5"/>
+          <p:cNvSpPr>
+            <a:spLocks noGrp="1"/>
+          </p:cNvSpPr>
+          <p:nvPr>
+            <p:ph sz="quarter" idx="4"/>
+          </p:nvPr>
+        </p:nvSpPr>
+        <p:spPr/>
+        <p:txBody>
+          <a:bodyPr/>
+          <a:lstStyle/>
+          <a:p>
+            <a:endParaRPr lang="pt-PT"/>
           </a:p>
         </p:txBody>
       </p:sp>
@@ -4547,6 +4641,93 @@
       </p:transition>
     </mc:Choice>
     <mc:Fallback xmlns="">
+      <p:transition spd="med">
+        <p:fade/>
+      </p:transition>
+    </mc:Fallback>
+  </mc:AlternateContent>
+  <p:timing>
+    <p:tnLst>
+      <p:par>
+        <p:cTn id="1" dur="indefinite" restart="never" nodeType="tmRoot"/>
+      </p:par>
+    </p:tnLst>
+  </p:timing>
+</p:sld>
+</file>
+
+<file path=ppt/slides/slide3.xml><?xml version="1.0" encoding="utf-8"?>
+<p:sld xmlns:a="http://schemas.openxmlformats.org/drawingml/2006/main" xmlns:r="http://schemas.openxmlformats.org/officeDocument/2006/relationships" xmlns:p="http://schemas.openxmlformats.org/presentationml/2006/main">
+  <p:cSld>
+    <p:spTree>
+      <p:nvGrpSpPr>
+        <p:cNvPr id="1" name=""/>
+        <p:cNvGrpSpPr/>
+        <p:nvPr/>
+      </p:nvGrpSpPr>
+      <p:grpSpPr>
+        <a:xfrm>
+          <a:off x="0" y="0"/>
+          <a:ext cx="0" cy="0"/>
+          <a:chOff x="0" y="0"/>
+          <a:chExt cx="0" cy="0"/>
+        </a:xfrm>
+      </p:grpSpPr>
+      <p:sp>
+        <p:nvSpPr>
+          <p:cNvPr id="7" name="Título 6"/>
+          <p:cNvSpPr>
+            <a:spLocks noGrp="1"/>
+          </p:cNvSpPr>
+          <p:nvPr>
+            <p:ph type="ctrTitle"/>
+          </p:nvPr>
+        </p:nvSpPr>
+        <p:spPr/>
+        <p:txBody>
+          <a:bodyPr/>
+          <a:lstStyle/>
+          <a:p>
+            <a:endParaRPr lang="pt-PT"/>
+          </a:p>
+        </p:txBody>
+      </p:sp>
+      <p:sp>
+        <p:nvSpPr>
+          <p:cNvPr id="8" name="Subtítulo 7"/>
+          <p:cNvSpPr>
+            <a:spLocks noGrp="1"/>
+          </p:cNvSpPr>
+          <p:nvPr>
+            <p:ph type="subTitle" idx="1"/>
+          </p:nvPr>
+        </p:nvSpPr>
+        <p:spPr/>
+        <p:txBody>
+          <a:bodyPr/>
+          <a:lstStyle/>
+          <a:p>
+            <a:endParaRPr lang="pt-PT"/>
+          </a:p>
+        </p:txBody>
+      </p:sp>
+    </p:spTree>
+    <p:extLst>
+      <p:ext uri="{BB962C8B-B14F-4D97-AF65-F5344CB8AC3E}">
+        <p14:creationId xmlns:p14="http://schemas.microsoft.com/office/powerpoint/2010/main" val="549636095"/>
+      </p:ext>
+    </p:extLst>
+  </p:cSld>
+  <p:clrMapOvr>
+    <a:masterClrMapping/>
+  </p:clrMapOvr>
+  <mc:AlternateContent xmlns:mc="http://schemas.openxmlformats.org/markup-compatibility/2006">
+    <mc:Choice xmlns:p14="http://schemas.microsoft.com/office/powerpoint/2010/main" Requires="p14">
+      <p:transition spd="med" p14:dur="700">
+        <p:fade/>
+      </p:transition>
+    </mc:Choice>
+    <mc:Fallback>
       <p:transition spd="med">
         <p:fade/>
       </p:transition>
@@ -5346,12 +5527,9 @@
 </file>
 
 <file path=customXml/item1.xml><?xml version="1.0" encoding="utf-8"?>
-<?mso-contentType ?>
-<FormTemplates xmlns="http://schemas.microsoft.com/sharepoint/v3/contenttype/forms">
-  <Display>DocumentLibraryForm</Display>
-  <Edit>DocumentLibraryForm</Edit>
-  <New>DocumentLibraryForm</New>
-</FormTemplates>
+<p:properties xmlns:p="http://schemas.microsoft.com/office/2006/metadata/properties" xmlns:xsi="http://www.w3.org/2001/XMLSchema-instance" xmlns:pc="http://schemas.microsoft.com/office/infopath/2007/PartnerControls">
+  <documentManagement/>
+</p:properties>
 </file>
 
 <file path=customXml/item2.xml><?xml version="1.0" encoding="utf-8"?>
@@ -5469,15 +5647,25 @@
 </file>
 
 <file path=customXml/item3.xml><?xml version="1.0" encoding="utf-8"?>
-<p:properties xmlns:p="http://schemas.microsoft.com/office/2006/metadata/properties" xmlns:xsi="http://www.w3.org/2001/XMLSchema-instance" xmlns:pc="http://schemas.microsoft.com/office/infopath/2007/PartnerControls">
-  <documentManagement/>
-</p:properties>
+<?mso-contentType ?>
+<FormTemplates xmlns="http://schemas.microsoft.com/sharepoint/v3/contenttype/forms">
+  <Display>DocumentLibraryForm</Display>
+  <Edit>DocumentLibraryForm</Edit>
+  <New>DocumentLibraryForm</New>
+</FormTemplates>
 </file>
 
 <file path=customXml/itemProps1.xml><?xml version="1.0" encoding="utf-8"?>
-<ds:datastoreItem xmlns:ds="http://schemas.openxmlformats.org/officeDocument/2006/customXml" ds:itemID="{9F7A874A-6E55-415B-9061-8B2D43DC2F48}">
+<ds:datastoreItem xmlns:ds="http://schemas.openxmlformats.org/officeDocument/2006/customXml" ds:itemID="{91BC99BC-3A63-4255-9D4F-38C5B80A3193}">
   <ds:schemaRefs>
-    <ds:schemaRef ds:uri="http://schemas.microsoft.com/sharepoint/v3/contenttype/forms"/>
+    <ds:schemaRef ds:uri="http://purl.org/dc/terms/"/>
+    <ds:schemaRef ds:uri="http://schemas.openxmlformats.org/package/2006/metadata/core-properties"/>
+    <ds:schemaRef ds:uri="http://purl.org/dc/dcmitype/"/>
+    <ds:schemaRef ds:uri="http://schemas.microsoft.com/office/infopath/2007/PartnerControls"/>
+    <ds:schemaRef ds:uri="http://purl.org/dc/elements/1.1/"/>
+    <ds:schemaRef ds:uri="http://schemas.microsoft.com/office/2006/metadata/properties"/>
+    <ds:schemaRef ds:uri="http://schemas.microsoft.com/office/2006/documentManagement/types"/>
+    <ds:schemaRef ds:uri="http://www.w3.org/XML/1998/namespace"/>
   </ds:schemaRefs>
 </ds:datastoreItem>
 </file>
@@ -5499,16 +5687,9 @@
 </file>
 
 <file path=customXml/itemProps3.xml><?xml version="1.0" encoding="utf-8"?>
-<ds:datastoreItem xmlns:ds="http://schemas.openxmlformats.org/officeDocument/2006/customXml" ds:itemID="{91BC99BC-3A63-4255-9D4F-38C5B80A3193}">
+<ds:datastoreItem xmlns:ds="http://schemas.openxmlformats.org/officeDocument/2006/customXml" ds:itemID="{9F7A874A-6E55-415B-9061-8B2D43DC2F48}">
   <ds:schemaRefs>
-    <ds:schemaRef ds:uri="http://purl.org/dc/dcmitype/"/>
-    <ds:schemaRef ds:uri="http://schemas.microsoft.com/office/2006/metadata/properties"/>
-    <ds:schemaRef ds:uri="http://www.w3.org/XML/1998/namespace"/>
-    <ds:schemaRef ds:uri="http://schemas.openxmlformats.org/package/2006/metadata/core-properties"/>
-    <ds:schemaRef ds:uri="http://schemas.microsoft.com/office/2006/documentManagement/types"/>
-    <ds:schemaRef ds:uri="http://schemas.microsoft.com/office/infopath/2007/PartnerControls"/>
-    <ds:schemaRef ds:uri="http://purl.org/dc/terms/"/>
-    <ds:schemaRef ds:uri="http://purl.org/dc/elements/1.1/"/>
+    <ds:schemaRef ds:uri="http://schemas.microsoft.com/sharepoint/v3/contenttype/forms"/>
   </ds:schemaRefs>
 </ds:datastoreItem>
 </file>
</xml_diff>